<commit_message>
feat(Reentrega): Ajuste no código e pdf final de entrega
</commit_message>
<xml_diff>
--- a/wilsonfalcao_Engenharia_de_Machine_Learning_pd.pptx
+++ b/wilsonfalcao_Engenharia_de_Machine_Learning_pd.pptx
@@ -9890,7 +9890,7 @@
       </p:sp>
       <p:pic>
         <p:nvPicPr>
-          <p:cNvPr id="1" name="Imagem 0"/>
+          <p:cNvPr id="2" name="Imagem 1"/>
           <p:cNvPicPr>
             <a:picLocks noChangeAspect="1"/>
           </p:cNvPicPr>
@@ -10284,7 +10284,7 @@
       </p:sp>
       <p:pic>
         <p:nvPicPr>
-          <p:cNvPr id="1" name="Imagem 0"/>
+          <p:cNvPr id="2" name="Imagem 1"/>
           <p:cNvPicPr>
             <a:picLocks noChangeAspect="1"/>
           </p:cNvPicPr>
@@ -10677,7 +10677,7 @@
       </p:sp>
       <p:pic>
         <p:nvPicPr>
-          <p:cNvPr id="1" name="Imagem 0"/>
+          <p:cNvPr id="3" name="Imagem 2"/>
           <p:cNvPicPr>
             <a:picLocks noChangeAspect="1"/>
           </p:cNvPicPr>
@@ -11126,7 +11126,7 @@
       </p:sp>
       <p:pic>
         <p:nvPicPr>
-          <p:cNvPr id="1" name="Imagem 0"/>
+          <p:cNvPr id="2" name="Imagem 1"/>
           <p:cNvPicPr>
             <a:picLocks noChangeAspect="1"/>
           </p:cNvPicPr>
@@ -11732,7 +11732,7 @@
       </p:sp>
       <p:pic>
         <p:nvPicPr>
-          <p:cNvPr id="1" name="Imagem 0"/>
+          <p:cNvPr id="2" name="Imagem 1"/>
           <p:cNvPicPr>
             <a:picLocks noChangeAspect="1"/>
           </p:cNvPicPr>
@@ -12068,22 +12068,6 @@
               </a:spcAft>
               <a:buNone/>
             </a:pPr>
-            <a:r>
-              <a:rPr lang="pt-BR" sz="1400"/>
-              <a:t>&lt;Indique o modelo escolhido, seus parâmetros e o desempenho do modelo na base de operação. Sirva o modelo como uma web-api ou carregue o modelo em memória na aplicação em produção. Compare o desempenho do modelo em desenvolvimento e em produção e justifique se o modelo em produção é aderente aos novos dados&gt;</a:t>
-            </a:r>
-            <a:endParaRPr sz="1400"/>
-          </a:p>
-          <a:p>
-            <a:pPr marL="0" lvl="0" indent="0" algn="just" rtl="0">
-              <a:spcBef>
-                <a:spcPts val="1200"/>
-              </a:spcBef>
-              <a:spcAft>
-                <a:spcPts val="0"/>
-              </a:spcAft>
-              <a:buNone/>
-            </a:pPr>
             <a:endParaRPr sz="1400"/>
           </a:p>
           <a:p>
@@ -12134,12 +12118,60 @@
             </a:pPr>
             <a:r>
               <a:rPr lang="pt-BR" sz="1400"/>
-              <a:t>&lt; Figura da matriz de confusão do modelo selecionado com os dados de produção&gt;</a:t>
-            </a:r>
-            <a:endParaRPr sz="1400"/>
+              <a:t> </a:t>
+            </a:r>
+            <a:endParaRPr lang="pt-BR" sz="1400"/>
           </a:p>
         </p:txBody>
       </p:sp>
+      <p:pic>
+        <p:nvPicPr>
+          <p:cNvPr id="1" name="Imagem 0"/>
+          <p:cNvPicPr>
+            <a:picLocks noChangeAspect="1"/>
+          </p:cNvPicPr>
+          <p:nvPr/>
+        </p:nvPicPr>
+        <p:blipFill>
+          <a:blip r:embed="rId1"/>
+          <a:stretch>
+            <a:fillRect/>
+          </a:stretch>
+        </p:blipFill>
+        <p:spPr>
+          <a:xfrm>
+            <a:off x="5203190" y="1557020"/>
+            <a:ext cx="3383280" cy="3227705"/>
+          </a:xfrm>
+          <a:prstGeom prst="rect">
+            <a:avLst/>
+          </a:prstGeom>
+        </p:spPr>
+      </p:pic>
+      <p:pic>
+        <p:nvPicPr>
+          <p:cNvPr id="2" name="Imagem 1"/>
+          <p:cNvPicPr>
+            <a:picLocks noChangeAspect="1"/>
+          </p:cNvPicPr>
+          <p:nvPr/>
+        </p:nvPicPr>
+        <p:blipFill>
+          <a:blip r:embed="rId2"/>
+          <a:stretch>
+            <a:fillRect/>
+          </a:stretch>
+        </p:blipFill>
+        <p:spPr>
+          <a:xfrm>
+            <a:off x="708025" y="2254885"/>
+            <a:ext cx="3993515" cy="2416810"/>
+          </a:xfrm>
+          <a:prstGeom prst="rect">
+            <a:avLst/>
+          </a:prstGeom>
+        </p:spPr>
+      </p:pic>
     </p:spTree>
   </p:cSld>
   <p:clrMapOvr>
@@ -12255,40 +12287,20 @@
             <a:endParaRPr sz="1400" b="1"/>
           </a:p>
           <a:p>
-            <a:pPr marL="0" lvl="0" indent="0" algn="just" rtl="0">
+            <a:pPr marL="457200" lvl="0" indent="0" algn="just" rtl="0">
               <a:spcBef>
                 <a:spcPts val="1200"/>
               </a:spcBef>
               <a:spcAft>
-                <a:spcPts val="0"/>
+                <a:spcPts val="1200"/>
               </a:spcAft>
               <a:buNone/>
             </a:pPr>
             <a:r>
               <a:rPr lang="pt-BR" sz="1400"/>
-              <a:t>&lt;Desenvolva uma aplicação em Streamlit para monitorar o resultado do modelo em produção.. </a:t>
-            </a:r>
-            <a:r>
-              <a:rPr lang="pt-BR" sz="1400"/>
-              <a:t>Descreva como podemos monitorar a saúde do modelo no cenário com e sem a disponibilidade da variável resposta para o modelo em operação.</a:t>
-            </a:r>
-            <a:r>
-              <a:rPr lang="pt-BR" sz="1400"/>
-              <a:t>&gt;</a:t>
-            </a:r>
-            <a:endParaRPr sz="1400"/>
-          </a:p>
-          <a:p>
-            <a:pPr marL="457200" lvl="0" indent="0" algn="just" rtl="0">
-              <a:spcBef>
-                <a:spcPts val="1200"/>
-              </a:spcBef>
-              <a:spcAft>
-                <a:spcPts val="1200"/>
-              </a:spcAft>
-              <a:buNone/>
-            </a:pPr>
-            <a:endParaRPr sz="1400"/>
+              <a:t>O Streamlit é uma excelente lib para desenvolver modelos onde o projeto visa a escalabilidade e reuso para diversos tipos de teste.</a:t>
+            </a:r>
+            <a:endParaRPr lang="pt-BR" sz="1400"/>
           </a:p>
         </p:txBody>
       </p:sp>
@@ -12317,62 +12329,6 @@
           <a:p>
             <a:pPr marL="0" lvl="0" indent="0" algn="just" rtl="0">
               <a:spcBef>
-                <a:spcPts val="0"/>
-              </a:spcBef>
-              <a:spcAft>
-                <a:spcPts val="0"/>
-              </a:spcAft>
-              <a:buNone/>
-            </a:pPr>
-            <a:r>
-              <a:rPr lang="pt-BR" sz="1400"/>
-              <a:t>&lt;print-screen da aplicação Streamlit para monitoramento. </a:t>
-            </a:r>
-            <a:r>
-              <a:rPr lang="pt-BR" sz="1400"/>
-              <a:t>Faça um plot com a distribuição da saída do modelo em desenvolvimento e em produção - ambas as distribuições precisam estar na mesma figura, com as respectivas legendas</a:t>
-            </a:r>
-            <a:r>
-              <a:rPr lang="pt-BR" sz="1400"/>
-              <a:t>&gt;</a:t>
-            </a:r>
-            <a:endParaRPr sz="1400"/>
-          </a:p>
-          <a:p>
-            <a:pPr marL="0" lvl="0" indent="0" algn="just" rtl="0">
-              <a:spcBef>
-                <a:spcPts val="1200"/>
-              </a:spcBef>
-              <a:spcAft>
-                <a:spcPts val="0"/>
-              </a:spcAft>
-              <a:buNone/>
-            </a:pPr>
-            <a:r>
-              <a:rPr lang="pt-BR" sz="1400"/>
-              <a:t>OU</a:t>
-            </a:r>
-            <a:endParaRPr sz="1400"/>
-          </a:p>
-          <a:p>
-            <a:pPr marL="0" lvl="0" indent="0" algn="just" rtl="0">
-              <a:spcBef>
-                <a:spcPts val="1200"/>
-              </a:spcBef>
-              <a:spcAft>
-                <a:spcPts val="0"/>
-              </a:spcAft>
-              <a:buNone/>
-            </a:pPr>
-            <a:r>
-              <a:rPr lang="pt-BR" sz="1400"/>
-              <a:t>&lt;Tabela com as métricas do modelo em desenvolvimento e em produção&gt;</a:t>
-            </a:r>
-            <a:endParaRPr sz="1400"/>
-          </a:p>
-          <a:p>
-            <a:pPr marL="0" lvl="0" indent="0" algn="just" rtl="0">
-              <a:spcBef>
                 <a:spcPts val="1200"/>
               </a:spcBef>
               <a:spcAft>
@@ -12384,6 +12340,30 @@
           </a:p>
         </p:txBody>
       </p:sp>
+      <p:pic>
+        <p:nvPicPr>
+          <p:cNvPr id="1" name="Imagem 0"/>
+          <p:cNvPicPr>
+            <a:picLocks noChangeAspect="1"/>
+          </p:cNvPicPr>
+          <p:nvPr/>
+        </p:nvPicPr>
+        <p:blipFill>
+          <a:blip r:embed="rId1"/>
+          <a:stretch>
+            <a:fillRect/>
+          </a:stretch>
+        </p:blipFill>
+        <p:spPr>
+          <a:xfrm>
+            <a:off x="4696460" y="1505585"/>
+            <a:ext cx="4265295" cy="2421255"/>
+          </a:xfrm>
+          <a:prstGeom prst="rect">
+            <a:avLst/>
+          </a:prstGeom>
+        </p:spPr>
+      </p:pic>
     </p:spTree>
   </p:cSld>
   <p:clrMapOvr>
@@ -12479,7 +12459,7 @@
         </p:spPr>
         <p:txBody>
           <a:bodyPr spcFirstLastPara="1" wrap="square" lIns="91425" tIns="91425" rIns="91425" bIns="91425" anchor="t" anchorCtr="0">
-            <a:normAutofit/>
+            <a:normAutofit fontScale="70000"/>
           </a:bodyPr>
           <a:lstStyle/>
           <a:p>
@@ -12532,18 +12512,102 @@
               <a:rPr lang="pt-BR" sz="1400"/>
               <a:t>:</a:t>
             </a:r>
+            <a:endParaRPr lang="pt-BR" sz="1400"/>
+          </a:p>
+          <a:p>
+            <a:pPr marL="0" lvl="0" indent="0" algn="just" rtl="0">
+              <a:spcBef>
+                <a:spcPts val="1200"/>
+              </a:spcBef>
+              <a:spcAft>
+                <a:spcPts val="0"/>
+              </a:spcAft>
+              <a:buNone/>
+            </a:pPr>
+            <a:r>
+              <a:rPr sz="1400"/>
+              <a:t>Mudança na Distribuição dos Dados: </a:t>
+            </a:r>
+            <a:r>
+              <a:rPr lang="pt-BR" sz="1400"/>
+              <a:t>Caso </a:t>
+            </a:r>
+            <a:r>
+              <a:rPr sz="1400"/>
+              <a:t>a distribuição dos dados na base de operação mud</a:t>
+            </a:r>
+            <a:r>
+              <a:rPr lang="pt-BR" sz="1400"/>
+              <a:t>e de forma</a:t>
+            </a:r>
+            <a:r>
+              <a:rPr sz="1400"/>
+              <a:t> significativamente, o modelo</a:t>
+            </a:r>
+            <a:r>
+              <a:rPr lang="pt-BR" sz="1400"/>
+              <a:t> </a:t>
+            </a:r>
+            <a:r>
+              <a:rPr sz="1400"/>
+              <a:t>perde sua capacidade de generalização. </a:t>
+            </a:r>
+            <a:r>
+              <a:rPr lang="pt-BR" sz="1400"/>
+              <a:t>M</a:t>
+            </a:r>
+            <a:r>
+              <a:rPr sz="1400"/>
+              <a:t>onitorar regularmente a distribuição dos dados</a:t>
+            </a:r>
+            <a:r>
+              <a:rPr lang="pt-BR" sz="1400"/>
+              <a:t>e </a:t>
+            </a:r>
+            <a:r>
+              <a:rPr sz="1400"/>
+              <a:t>retrainando o modelo quando necessário.</a:t>
+            </a:r>
             <a:endParaRPr sz="1400"/>
           </a:p>
           <a:p>
-            <a:pPr marL="457200" lvl="0" indent="0" algn="just" rtl="0">
+            <a:pPr marL="0" lvl="0" indent="0" algn="just" rtl="0">
               <a:spcBef>
                 <a:spcPts val="1200"/>
               </a:spcBef>
               <a:spcAft>
-                <a:spcPts val="1200"/>
-              </a:spcAft>
-              <a:buNone/>
-            </a:pPr>
+                <a:spcPts val="0"/>
+              </a:spcAft>
+              <a:buNone/>
+            </a:pPr>
+            <a:r>
+              <a:rPr sz="1400"/>
+              <a:t>Decaimento de Desempenho: </a:t>
+            </a:r>
+            <a:r>
+              <a:rPr lang="pt-BR" sz="1400"/>
+              <a:t>Caso</a:t>
+            </a:r>
+            <a:r>
+              <a:rPr sz="1400"/>
+              <a:t> as métricas de desempenho do modelo diminuir</a:t>
+            </a:r>
+            <a:r>
+              <a:rPr lang="pt-BR" sz="1400"/>
+              <a:t>,</a:t>
+            </a:r>
+            <a:r>
+              <a:rPr sz="1400"/>
+              <a:t> isso pode indicar que o modelo está perdendo sua eficácia devido a mudanças nos padrões dos dados ou em outros fatore. O retreinamento </a:t>
+            </a:r>
+            <a:r>
+              <a:rPr lang="pt-BR" sz="1400"/>
+              <a:t>é uma boa alternativa</a:t>
+            </a:r>
+            <a:r>
+              <a:rPr sz="1400"/>
+              <a:t>.</a:t>
+            </a:r>
             <a:endParaRPr sz="1400"/>
           </a:p>
         </p:txBody>
@@ -12587,6 +12651,46 @@
             <a:r>
               <a:rPr lang="pt-BR" sz="1400"/>
               <a:t>:</a:t>
+            </a:r>
+            <a:endParaRPr lang="pt-BR" sz="1400"/>
+          </a:p>
+          <a:p>
+            <a:pPr marL="0" lvl="0" indent="0" algn="just" rtl="0">
+              <a:spcBef>
+                <a:spcPts val="0"/>
+              </a:spcBef>
+              <a:spcAft>
+                <a:spcPts val="1200"/>
+              </a:spcAft>
+              <a:buNone/>
+            </a:pPr>
+            <a:r>
+              <a:rPr sz="1400"/>
+              <a:t>Retreinamento: O modelo </a:t>
+            </a:r>
+            <a:r>
+              <a:rPr lang="pt-BR" sz="1400"/>
+              <a:t>pode ser</a:t>
+            </a:r>
+            <a:r>
+              <a:rPr sz="1400"/>
+              <a:t> re-treinado em intervalos regulares, independentemente de mudanças. Isso</a:t>
+            </a:r>
+            <a:r>
+              <a:rPr lang="pt-BR" sz="1400"/>
+              <a:t> </a:t>
+            </a:r>
+            <a:r>
+              <a:rPr sz="1400"/>
+              <a:t>garant</a:t>
+            </a:r>
+            <a:r>
+              <a:rPr lang="pt-BR" sz="1400"/>
+              <a:t>e</a:t>
+            </a:r>
+            <a:r>
+              <a:rPr sz="1400"/>
+              <a:t> que o modelo esteja sempre atualizado.</a:t>
             </a:r>
             <a:endParaRPr sz="1400"/>
           </a:p>

</xml_diff>

<commit_message>
fix(PDF): Reentrega de trabalho
</commit_message>
<xml_diff>
--- a/wilsonfalcao_Engenharia_de_Machine_Learning_pd.pptx
+++ b/wilsonfalcao_Engenharia_de_Machine_Learning_pd.pptx
@@ -12126,7 +12126,7 @@
       </p:sp>
       <p:pic>
         <p:nvPicPr>
-          <p:cNvPr id="1" name="Imagem 0"/>
+          <p:cNvPr id="3" name="Imagem 2"/>
           <p:cNvPicPr>
             <a:picLocks noChangeAspect="1"/>
           </p:cNvPicPr>
@@ -12342,7 +12342,7 @@
       </p:sp>
       <p:pic>
         <p:nvPicPr>
-          <p:cNvPr id="1" name="Imagem 0"/>
+          <p:cNvPr id="2" name="Imagem 1"/>
           <p:cNvPicPr>
             <a:picLocks noChangeAspect="1"/>
           </p:cNvPicPr>
@@ -12350,6 +12350,7 @@
         </p:nvPicPr>
         <p:blipFill>
           <a:blip r:embed="rId1"/>
+          <a:srcRect t="2387"/>
           <a:stretch>
             <a:fillRect/>
           </a:stretch>
@@ -12357,7 +12358,7 @@
         <p:spPr>
           <a:xfrm>
             <a:off x="4696460" y="1505585"/>
-            <a:ext cx="4265295" cy="2421255"/>
+            <a:ext cx="4265295" cy="2363470"/>
           </a:xfrm>
           <a:prstGeom prst="rect">
             <a:avLst/>

</xml_diff>

<commit_message>
fix(Ajuste): Ajuste no quisito 4. Reentrega
</commit_message>
<xml_diff>
--- a/wilsonfalcao_Engenharia_de_Machine_Learning_pd.pptx
+++ b/wilsonfalcao_Engenharia_de_Machine_Learning_pd.pptx
@@ -7,6 +7,9 @@
   <p:notesMasterIdLst>
     <p:notesMasterId r:id="rId4"/>
   </p:notesMasterIdLst>
+  <p:handoutMasterIdLst>
+    <p:handoutMasterId r:id="rId27"/>
+  </p:handoutMasterIdLst>
   <p:sldIdLst>
     <p:sldId id="256" r:id="rId3"/>
     <p:sldId id="257" r:id="rId5"/>
@@ -28,19 +31,20 @@
     <p:sldId id="273" r:id="rId21"/>
     <p:sldId id="274" r:id="rId22"/>
     <p:sldId id="275" r:id="rId23"/>
-    <p:sldId id="276" r:id="rId24"/>
-    <p:sldId id="277" r:id="rId25"/>
+    <p:sldId id="278" r:id="rId24"/>
+    <p:sldId id="276" r:id="rId25"/>
+    <p:sldId id="277" r:id="rId26"/>
   </p:sldIdLst>
   <p:sldSz cx="9144000" cy="5143500"/>
   <p:notesSz cx="6858000" cy="9144000"/>
   <p:embeddedFontLst>
     <p:embeddedFont>
       <p:font typeface="Merriweather" panose="00000500000000000000"/>
-      <p:regular r:id="rId29"/>
+      <p:regular r:id="rId31"/>
     </p:embeddedFont>
     <p:embeddedFont>
       <p:font typeface="Roboto" panose="02000000000000000000"/>
-      <p:regular r:id="rId30"/>
+      <p:regular r:id="rId32"/>
     </p:embeddedFont>
   </p:embeddedFontLst>
   <p:defaultTextStyle>
@@ -289,6 +293,164 @@
     </p:ext>
   </p:extLst>
 </p:presentation>
+</file>
+
+<file path=ppt/handoutMasters/handoutMaster1.xml><?xml version="1.0" encoding="utf-8"?>
+<p:handoutMaster xmlns:a="http://schemas.openxmlformats.org/drawingml/2006/main" xmlns:r="http://schemas.openxmlformats.org/officeDocument/2006/relationships" xmlns:p="http://schemas.openxmlformats.org/presentationml/2006/main">
+  <p:cSld>
+    <p:bg>
+      <p:bgRef idx="1001">
+        <a:schemeClr val="bg1"/>
+      </p:bgRef>
+    </p:bg>
+    <p:spTree>
+      <p:nvGrpSpPr>
+        <p:cNvPr id="1" name=""/>
+        <p:cNvGrpSpPr/>
+        <p:nvPr/>
+      </p:nvGrpSpPr>
+      <p:grpSpPr>
+        <a:xfrm>
+          <a:off x="0" y="0"/>
+          <a:ext cx="0" cy="0"/>
+          <a:chOff x="0" y="0"/>
+          <a:chExt cx="0" cy="0"/>
+        </a:xfrm>
+      </p:grpSpPr>
+      <p:sp>
+        <p:nvSpPr>
+          <p:cNvPr id="2" name="Espaço Reservado para Cabeçalho 1"/>
+          <p:cNvSpPr>
+            <a:spLocks noGrp="1"/>
+          </p:cNvSpPr>
+          <p:nvPr>
+            <p:ph type="hdr" sz="quarter"/>
+          </p:nvPr>
+        </p:nvSpPr>
+        <p:spPr>
+          <a:xfrm>
+            <a:off x="0" y="0"/>
+            <a:ext cx="2971800" cy="458788"/>
+          </a:xfrm>
+          <a:prstGeom prst="rect">
+            <a:avLst/>
+          </a:prstGeom>
+        </p:spPr>
+        <p:txBody>
+          <a:bodyPr vert="horz" lIns="91440" tIns="45720" rIns="91440" bIns="45720" rtlCol="0"/>
+          <a:lstStyle>
+            <a:lvl1pPr algn="l">
+              <a:defRPr sz="1200"/>
+            </a:lvl1pPr>
+          </a:lstStyle>
+          <a:p>
+            <a:endParaRPr lang="pt-BR"/>
+          </a:p>
+        </p:txBody>
+      </p:sp>
+      <p:sp>
+        <p:nvSpPr>
+          <p:cNvPr id="3" name="Espaço Reservado para Data 2"/>
+          <p:cNvSpPr>
+            <a:spLocks noGrp="1"/>
+          </p:cNvSpPr>
+          <p:nvPr>
+            <p:ph type="dt" sz="quarter" idx="1"/>
+          </p:nvPr>
+        </p:nvSpPr>
+        <p:spPr>
+          <a:xfrm>
+            <a:off x="3884613" y="0"/>
+            <a:ext cx="2971800" cy="458788"/>
+          </a:xfrm>
+          <a:prstGeom prst="rect">
+            <a:avLst/>
+          </a:prstGeom>
+        </p:spPr>
+        <p:txBody>
+          <a:bodyPr vert="horz" lIns="91440" tIns="45720" rIns="91440" bIns="45720" rtlCol="0"/>
+          <a:lstStyle>
+            <a:lvl1pPr algn="r">
+              <a:defRPr sz="1200"/>
+            </a:lvl1pPr>
+          </a:lstStyle>
+          <a:p>
+            <a:fld id="{C8F18574-DBF7-465D-B037-FE631F471BB2}" type="datetimeFigureOut">
+              <a:rPr lang="pt-BR" smtClean="0"/>
+            </a:fld>
+            <a:endParaRPr lang="pt-BR"/>
+          </a:p>
+        </p:txBody>
+      </p:sp>
+      <p:sp>
+        <p:nvSpPr>
+          <p:cNvPr id="4" name="Espaço Reservado para Rodapé 3"/>
+          <p:cNvSpPr>
+            <a:spLocks noGrp="1"/>
+          </p:cNvSpPr>
+          <p:nvPr>
+            <p:ph type="ftr" sz="quarter" idx="2"/>
+          </p:nvPr>
+        </p:nvSpPr>
+        <p:spPr>
+          <a:xfrm>
+            <a:off x="0" y="8685213"/>
+            <a:ext cx="2971800" cy="458787"/>
+          </a:xfrm>
+          <a:prstGeom prst="rect">
+            <a:avLst/>
+          </a:prstGeom>
+        </p:spPr>
+        <p:txBody>
+          <a:bodyPr vert="horz" lIns="91440" tIns="45720" rIns="91440" bIns="45720" rtlCol="0" anchor="b"/>
+          <a:lstStyle>
+            <a:lvl1pPr algn="l">
+              <a:defRPr sz="1200"/>
+            </a:lvl1pPr>
+          </a:lstStyle>
+          <a:p>
+            <a:endParaRPr lang="pt-BR"/>
+          </a:p>
+        </p:txBody>
+      </p:sp>
+      <p:sp>
+        <p:nvSpPr>
+          <p:cNvPr id="5" name="Espaço Reservado para Número de Slide 4"/>
+          <p:cNvSpPr>
+            <a:spLocks noGrp="1"/>
+          </p:cNvSpPr>
+          <p:nvPr>
+            <p:ph type="sldNum" sz="quarter" idx="3"/>
+          </p:nvPr>
+        </p:nvSpPr>
+        <p:spPr>
+          <a:xfrm>
+            <a:off x="3884613" y="8685213"/>
+            <a:ext cx="2971800" cy="458787"/>
+          </a:xfrm>
+          <a:prstGeom prst="rect">
+            <a:avLst/>
+          </a:prstGeom>
+        </p:spPr>
+        <p:txBody>
+          <a:bodyPr vert="horz" lIns="91440" tIns="45720" rIns="91440" bIns="45720" rtlCol="0" anchor="b"/>
+          <a:lstStyle>
+            <a:lvl1pPr algn="r">
+              <a:defRPr sz="1200"/>
+            </a:lvl1pPr>
+          </a:lstStyle>
+          <a:p>
+            <a:fld id="{744C3D8E-6D01-472B-9760-E65C392860FE}" type="slidenum">
+              <a:rPr lang="pt-BR" smtClean="0"/>
+            </a:fld>
+            <a:endParaRPr lang="pt-BR"/>
+          </a:p>
+        </p:txBody>
+      </p:sp>
+    </p:spTree>
+  </p:cSld>
+  <p:clrMap bg1="lt1" tx1="dk1" bg2="lt2" tx2="dk2" accent1="accent1" accent2="accent2" accent3="accent3" accent4="accent4" accent5="accent5" accent6="accent6" hlink="hlink" folHlink="folHlink"/>
+</p:handoutMaster>
 </file>
 
 <file path=ppt/notesMasters/notesMaster1.xml><?xml version="1.0" encoding="utf-8"?>
@@ -12185,6 +12347,141 @@
   <p:cSld>
     <p:spTree>
       <p:nvGrpSpPr>
+        <p:cNvPr id="1" name=""/>
+        <p:cNvGrpSpPr/>
+        <p:nvPr/>
+      </p:nvGrpSpPr>
+      <p:grpSpPr/>
+      <p:sp>
+        <p:nvSpPr>
+          <p:cNvPr id="4" name="Título 3"/>
+          <p:cNvSpPr/>
+          <p:nvPr>
+            <p:ph type="title"/>
+          </p:nvPr>
+        </p:nvSpPr>
+        <p:spPr/>
+        <p:txBody>
+          <a:bodyPr/>
+          <a:p>
+            <a:r>
+              <a:rPr lang="pt-BR">
+                <a:sym typeface="+mn-ea"/>
+              </a:rPr>
+              <a:t>Pipeline de Aplicação do Modelo</a:t>
+            </a:r>
+            <a:endParaRPr lang="pt-BR" altLang="en-US"/>
+          </a:p>
+        </p:txBody>
+      </p:sp>
+      <p:sp>
+        <p:nvSpPr>
+          <p:cNvPr id="5" name="Espaço Reservado para Texto 4"/>
+          <p:cNvSpPr/>
+          <p:nvPr>
+            <p:ph type="body" idx="1"/>
+          </p:nvPr>
+        </p:nvSpPr>
+        <p:spPr/>
+        <p:txBody>
+          <a:bodyPr/>
+          <a:p>
+            <a:pPr marL="146050" indent="0">
+              <a:buNone/>
+            </a:pPr>
+            <a:r>
+              <a:rPr lang="pt-BR" altLang="en-US"/>
+              <a:t>O aluno descreveu como monitorar a saúde do modelo no cenário com e sem a disponibilidade da variável alvo?</a:t>
+            </a:r>
+            <a:endParaRPr lang="pt-BR" altLang="en-US"/>
+          </a:p>
+        </p:txBody>
+      </p:sp>
+      <p:sp>
+        <p:nvSpPr>
+          <p:cNvPr id="6" name="Espaço Reservado para Texto 5"/>
+          <p:cNvSpPr/>
+          <p:nvPr>
+            <p:ph type="body" idx="2"/>
+          </p:nvPr>
+        </p:nvSpPr>
+        <p:spPr/>
+        <p:txBody>
+          <a:bodyPr>
+            <a:normAutofit fontScale="50000"/>
+          </a:bodyPr>
+          <a:p>
+            <a:r>
+              <a:rPr lang="pt-BR" altLang="en-US"/>
+              <a:t>Métricas de Desempenho: Acompanhar acurácia, AUC, recall e precisão orientará como estar indo o nosso modelo.</a:t>
+            </a:r>
+            <a:endParaRPr lang="pt-BR" altLang="en-US"/>
+          </a:p>
+          <a:p>
+            <a:endParaRPr lang="pt-BR" altLang="en-US"/>
+          </a:p>
+          <a:p>
+            <a:r>
+              <a:rPr lang="pt-BR" altLang="en-US"/>
+              <a:t>Matriz de Confusão e a Curva ROC: Entender como a classificação do modelo muda de acordo com os diferentes tipos de instâncias e especificidade.</a:t>
+            </a:r>
+            <a:endParaRPr lang="pt-BR" altLang="en-US"/>
+          </a:p>
+          <a:p>
+            <a:endParaRPr lang="pt-BR" altLang="en-US"/>
+          </a:p>
+          <a:p>
+            <a:r>
+              <a:rPr lang="pt-BR" altLang="en-US"/>
+              <a:t>Observar as Distribuições de Dados: Identificar mudanças de padrões que pode decair o desempenho do modelo.</a:t>
+            </a:r>
+            <a:endParaRPr lang="pt-BR" altLang="en-US"/>
+          </a:p>
+          <a:p>
+            <a:endParaRPr lang="pt-BR" altLang="en-US"/>
+          </a:p>
+          <a:p>
+            <a:r>
+              <a:rPr lang="pt-BR" altLang="en-US"/>
+              <a:t>Monitorar Entradas e Saídas de Dados: Caso variável alvo não for disponível, deverá ter atenção aos dados que o modelo treina. Devo avaliar, normalizar e procurar outliers. Isso inclui verificar se as entradas estão corretos, analisar as saídas do modelo e compará-las com o esperado.</a:t>
+            </a:r>
+            <a:endParaRPr lang="pt-BR" altLang="en-US"/>
+          </a:p>
+          <a:p>
+            <a:endParaRPr lang="pt-BR" altLang="en-US"/>
+          </a:p>
+          <a:p>
+            <a:r>
+              <a:rPr lang="pt-BR" altLang="en-US"/>
+              <a:t>Analisar Correlações: Verificar como as features se correlacionam. </a:t>
+            </a:r>
+            <a:endParaRPr lang="pt-BR" altLang="en-US"/>
+          </a:p>
+          <a:p>
+            <a:endParaRPr lang="pt-BR" altLang="en-US"/>
+          </a:p>
+          <a:p>
+            <a:r>
+              <a:rPr lang="pt-BR" altLang="en-US"/>
+              <a:t>Detectar Outliers: Buscar normalizar dados e grupos de valores dentro da média. Uma boa alternativa é usar o bloxplot para observações valores ou conjuntos fora do padrão</a:t>
+            </a:r>
+            <a:endParaRPr lang="pt-BR" altLang="en-US"/>
+          </a:p>
+        </p:txBody>
+      </p:sp>
+    </p:spTree>
+  </p:cSld>
+  <p:clrMapOvr>
+    <a:masterClrMapping/>
+  </p:clrMapOvr>
+</p:sld>
+</file>
+
+<file path=ppt/slides/slide22.xml><?xml version="1.0" encoding="utf-8"?>
+<p:sld xmlns:a="http://schemas.openxmlformats.org/drawingml/2006/main" xmlns:r="http://schemas.openxmlformats.org/officeDocument/2006/relationships" xmlns:p="http://schemas.openxmlformats.org/presentationml/2006/main">
+  <p:cSld>
+    <p:spTree>
+      <p:nvGrpSpPr>
         <p:cNvPr id="193" name="Shape 193"/>
         <p:cNvGrpSpPr/>
         <p:nvPr/>
@@ -12373,7 +12670,7 @@
 </p:sld>
 </file>
 
-<file path=ppt/slides/slide22.xml><?xml version="1.0" encoding="utf-8"?>
+<file path=ppt/slides/slide23.xml><?xml version="1.0" encoding="utf-8"?>
 <p:sld xmlns:a="http://schemas.openxmlformats.org/drawingml/2006/main" xmlns:r="http://schemas.openxmlformats.org/officeDocument/2006/relationships" xmlns:p="http://schemas.openxmlformats.org/presentationml/2006/main">
   <p:cSld>
     <p:spTree>
@@ -14658,4 +14955,263 @@
     </a:ext>
   </a:extLst>
 </a:theme>
+</file>
+
+<file path=ppt/theme/theme3.xml><?xml version="1.0" encoding="utf-8"?>
+<a:theme xmlns:a="http://schemas.openxmlformats.org/drawingml/2006/main" name="Tema do Office">
+  <a:themeElements>
+    <a:clrScheme name="Office">
+      <a:dk1>
+        <a:sysClr val="windowText" lastClr="000000"/>
+      </a:dk1>
+      <a:lt1>
+        <a:sysClr val="window" lastClr="FFFFFF"/>
+      </a:lt1>
+      <a:dk2>
+        <a:srgbClr val="44546A"/>
+      </a:dk2>
+      <a:lt2>
+        <a:srgbClr val="E7E6E6"/>
+      </a:lt2>
+      <a:accent1>
+        <a:srgbClr val="5B9BD5"/>
+      </a:accent1>
+      <a:accent2>
+        <a:srgbClr val="ED7D31"/>
+      </a:accent2>
+      <a:accent3>
+        <a:srgbClr val="A5A5A5"/>
+      </a:accent3>
+      <a:accent4>
+        <a:srgbClr val="FFC000"/>
+      </a:accent4>
+      <a:accent5>
+        <a:srgbClr val="4472C4"/>
+      </a:accent5>
+      <a:accent6>
+        <a:srgbClr val="70AD47"/>
+      </a:accent6>
+      <a:hlink>
+        <a:srgbClr val="0563C1"/>
+      </a:hlink>
+      <a:folHlink>
+        <a:srgbClr val="954F72"/>
+      </a:folHlink>
+    </a:clrScheme>
+    <a:fontScheme name="Office">
+      <a:majorFont>
+        <a:latin typeface="Calibri Light"/>
+        <a:ea typeface=""/>
+        <a:cs typeface=""/>
+        <a:font script="Jpan" typeface="游ゴシック Light"/>
+        <a:font script="Hang" typeface="맑은 고딕"/>
+        <a:font script="Hans" typeface="等线 Light"/>
+        <a:font script="Hant" typeface="新細明體"/>
+        <a:font script="Arab" typeface="Times New Roman"/>
+        <a:font script="Hebr" typeface="Times New Roman"/>
+        <a:font script="Thai" typeface="Angsana New"/>
+        <a:font script="Ethi" typeface="Nyala"/>
+        <a:font script="Beng" typeface="Vrinda"/>
+        <a:font script="Gujr" typeface="Shruti"/>
+        <a:font script="Khmr" typeface="MoolBoran"/>
+        <a:font script="Knda" typeface="Tunga"/>
+        <a:font script="Guru" typeface="Raavi"/>
+        <a:font script="Cans" typeface="Euphemia"/>
+        <a:font script="Cher" typeface="Plantagenet Cherokee"/>
+        <a:font script="Yiii" typeface="Microsoft Yi Baiti"/>
+        <a:font script="Tibt" typeface="Microsoft Himalaya"/>
+        <a:font script="Thaa" typeface="MV Boli"/>
+        <a:font script="Deva" typeface="Mangal"/>
+        <a:font script="Telu" typeface="Gautami"/>
+        <a:font script="Taml" typeface="Latha"/>
+        <a:font script="Syrc" typeface="Estrangelo Edessa"/>
+        <a:font script="Orya" typeface="Kalinga"/>
+        <a:font script="Mlym" typeface="Kartika"/>
+        <a:font script="Laoo" typeface="DokChampa"/>
+        <a:font script="Sinh" typeface="Iskoola Pota"/>
+        <a:font script="Mong" typeface="Mongolian Baiti"/>
+        <a:font script="Viet" typeface="Times New Roman"/>
+        <a:font script="Uigh" typeface="Microsoft Uighur"/>
+        <a:font script="Geor" typeface="Sylfaen"/>
+      </a:majorFont>
+      <a:minorFont>
+        <a:latin typeface="Calibri"/>
+        <a:ea typeface=""/>
+        <a:cs typeface=""/>
+        <a:font script="Jpan" typeface="游ゴシック"/>
+        <a:font script="Hang" typeface="맑은 고딕"/>
+        <a:font script="Hans" typeface="等线"/>
+        <a:font script="Hant" typeface="新細明體"/>
+        <a:font script="Arab" typeface="Arial"/>
+        <a:font script="Hebr" typeface="Arial"/>
+        <a:font script="Thai" typeface="Cordia New"/>
+        <a:font script="Ethi" typeface="Nyala"/>
+        <a:font script="Beng" typeface="Vrinda"/>
+        <a:font script="Gujr" typeface="Shruti"/>
+        <a:font script="Khmr" typeface="DaunPenh"/>
+        <a:font script="Knda" typeface="Tunga"/>
+        <a:font script="Guru" typeface="Raavi"/>
+        <a:font script="Cans" typeface="Euphemia"/>
+        <a:font script="Cher" typeface="Plantagenet Cherokee"/>
+        <a:font script="Yiii" typeface="Microsoft Yi Baiti"/>
+        <a:font script="Tibt" typeface="Microsoft Himalaya"/>
+        <a:font script="Thaa" typeface="MV Boli"/>
+        <a:font script="Deva" typeface="Mangal"/>
+        <a:font script="Telu" typeface="Gautami"/>
+        <a:font script="Taml" typeface="Latha"/>
+        <a:font script="Syrc" typeface="Estrangelo Edessa"/>
+        <a:font script="Orya" typeface="Kalinga"/>
+        <a:font script="Mlym" typeface="Kartika"/>
+        <a:font script="Laoo" typeface="DokChampa"/>
+        <a:font script="Sinh" typeface="Iskoola Pota"/>
+        <a:font script="Mong" typeface="Mongolian Baiti"/>
+        <a:font script="Viet" typeface="Arial"/>
+        <a:font script="Uigh" typeface="Microsoft Uighur"/>
+        <a:font script="Geor" typeface="Sylfaen"/>
+      </a:minorFont>
+    </a:fontScheme>
+    <a:fmtScheme name="Office">
+      <a:fillStyleLst>
+        <a:solidFill>
+          <a:schemeClr val="phClr"/>
+        </a:solidFill>
+        <a:gradFill rotWithShape="1">
+          <a:gsLst>
+            <a:gs pos="0">
+              <a:schemeClr val="phClr">
+                <a:lumMod val="110000"/>
+                <a:satMod val="105000"/>
+                <a:tint val="67000"/>
+              </a:schemeClr>
+            </a:gs>
+            <a:gs pos="50000">
+              <a:schemeClr val="phClr">
+                <a:lumMod val="105000"/>
+                <a:satMod val="103000"/>
+                <a:tint val="73000"/>
+              </a:schemeClr>
+            </a:gs>
+            <a:gs pos="100000">
+              <a:schemeClr val="phClr">
+                <a:lumMod val="105000"/>
+                <a:satMod val="109000"/>
+                <a:tint val="81000"/>
+              </a:schemeClr>
+            </a:gs>
+          </a:gsLst>
+          <a:lin ang="5400000" scaled="0"/>
+        </a:gradFill>
+        <a:gradFill rotWithShape="1">
+          <a:gsLst>
+            <a:gs pos="0">
+              <a:schemeClr val="phClr">
+                <a:satMod val="103000"/>
+                <a:lumMod val="102000"/>
+                <a:tint val="94000"/>
+              </a:schemeClr>
+            </a:gs>
+            <a:gs pos="50000">
+              <a:schemeClr val="phClr">
+                <a:satMod val="110000"/>
+                <a:lumMod val="100000"/>
+                <a:shade val="100000"/>
+              </a:schemeClr>
+            </a:gs>
+            <a:gs pos="100000">
+              <a:schemeClr val="phClr">
+                <a:lumMod val="99000"/>
+                <a:satMod val="120000"/>
+                <a:shade val="78000"/>
+              </a:schemeClr>
+            </a:gs>
+          </a:gsLst>
+          <a:lin ang="5400000" scaled="0"/>
+        </a:gradFill>
+      </a:fillStyleLst>
+      <a:lnStyleLst>
+        <a:ln w="6350" cap="flat" cmpd="sng" algn="ctr">
+          <a:solidFill>
+            <a:schemeClr val="phClr"/>
+          </a:solidFill>
+          <a:prstDash val="solid"/>
+          <a:miter lim="800000"/>
+        </a:ln>
+        <a:ln w="12700" cap="flat" cmpd="sng" algn="ctr">
+          <a:solidFill>
+            <a:schemeClr val="phClr"/>
+          </a:solidFill>
+          <a:prstDash val="solid"/>
+          <a:miter lim="800000"/>
+        </a:ln>
+        <a:ln w="19050" cap="flat" cmpd="sng" algn="ctr">
+          <a:solidFill>
+            <a:schemeClr val="phClr"/>
+          </a:solidFill>
+          <a:prstDash val="solid"/>
+          <a:miter lim="800000"/>
+        </a:ln>
+      </a:lnStyleLst>
+      <a:effectStyleLst>
+        <a:effectStyle>
+          <a:effectLst/>
+        </a:effectStyle>
+        <a:effectStyle>
+          <a:effectLst/>
+        </a:effectStyle>
+        <a:effectStyle>
+          <a:effectLst>
+            <a:outerShdw blurRad="57150" dist="19050" dir="5400000" algn="ctr" rotWithShape="0">
+              <a:srgbClr val="000000">
+                <a:alpha val="63000"/>
+              </a:srgbClr>
+            </a:outerShdw>
+          </a:effectLst>
+        </a:effectStyle>
+      </a:effectStyleLst>
+      <a:bgFillStyleLst>
+        <a:solidFill>
+          <a:schemeClr val="phClr"/>
+        </a:solidFill>
+        <a:solidFill>
+          <a:schemeClr val="phClr">
+            <a:tint val="95000"/>
+            <a:satMod val="170000"/>
+          </a:schemeClr>
+        </a:solidFill>
+        <a:gradFill rotWithShape="1">
+          <a:gsLst>
+            <a:gs pos="0">
+              <a:schemeClr val="phClr">
+                <a:tint val="93000"/>
+                <a:satMod val="150000"/>
+                <a:shade val="98000"/>
+                <a:lumMod val="102000"/>
+              </a:schemeClr>
+            </a:gs>
+            <a:gs pos="50000">
+              <a:schemeClr val="phClr">
+                <a:tint val="98000"/>
+                <a:satMod val="130000"/>
+                <a:shade val="90000"/>
+                <a:lumMod val="103000"/>
+              </a:schemeClr>
+            </a:gs>
+            <a:gs pos="100000">
+              <a:schemeClr val="phClr">
+                <a:shade val="63000"/>
+                <a:satMod val="120000"/>
+              </a:schemeClr>
+            </a:gs>
+          </a:gsLst>
+          <a:lin ang="5400000" scaled="0"/>
+        </a:gradFill>
+      </a:bgFillStyleLst>
+    </a:fmtScheme>
+  </a:themeElements>
+  <a:extLst>
+    <a:ext uri="{05A4C25C-085E-4340-85A3-A5531E510DB2}">
+      <thm15:themeFamily xmlns:thm15="http://schemas.microsoft.com/office/thememl/2012/main" name="Office Theme" id="{62F939B6-93AF-4DB8-9C6B-D6C7DFDC589F}" vid="{4A3C46E8-61CC-4603-A589-7422A47A8E4A}"/>
+    </a:ext>
+  </a:extLst>
+</a:theme>
 </file>
</xml_diff>